<commit_message>
Updated Day 2 - Slides and materials.
</commit_message>
<xml_diff>
--- a/Day 2/Slides/1. Course Overview/course-overview-slides.pptx
+++ b/Day 2/Slides/1. Course Overview/course-overview-slides.pptx
@@ -4149,32 +4149,59 @@
           </a:p>
         </p:txBody>
       </p:sp>
-      <p:pic>
-        <p:nvPicPr>
-          <p:cNvPr id="5" name="Content Placeholder 4"/>
-          <p:cNvPicPr>
-            <a:picLocks noChangeAspect="1"/>
-          </p:cNvPicPr>
+      <p:graphicFrame>
+        <p:nvGraphicFramePr>
+          <p:cNvPr id="6" name="Content Placeholder 5"/>
+          <p:cNvGraphicFramePr>
+            <a:graphicFrameLocks noChangeAspect="1"/>
+          </p:cNvGraphicFramePr>
           <p:nvPr>
             <p:ph idx="1"/>
           </p:nvPr>
-        </p:nvPicPr>
-        <p:blipFill>
-          <a:blip r:embed="rId1"/>
-          <a:stretch>
-            <a:fillRect/>
-          </a:stretch>
-        </p:blipFill>
-        <p:spPr>
-          <a:xfrm>
-            <a:off x="624840" y="744855"/>
-            <a:ext cx="11170920" cy="5611495"/>
-          </a:xfrm>
-          <a:prstGeom prst="rect">
-            <a:avLst/>
-          </a:prstGeom>
-        </p:spPr>
-      </p:pic>
+        </p:nvGraphicFramePr>
+        <p:xfrm>
+          <a:off x="499110" y="866140"/>
+          <a:ext cx="11269345" cy="5668645"/>
+        </p:xfrm>
+        <a:graphic>
+          <a:graphicData uri="http://schemas.openxmlformats.org/presentationml/2006/ole">
+            <mc:AlternateContent xmlns:mc="http://schemas.openxmlformats.org/markup-compatibility/2006">
+              <mc:Choice xmlns:v="urn:schemas-microsoft-com:vml" Requires="v">
+                <p:oleObj spid="_x0000_s7" name="" r:id="rId1" imgW="11172825" imgH="5619750" progId="Paint.Picture">
+                  <p:embed/>
+                </p:oleObj>
+              </mc:Choice>
+              <mc:Fallback>
+                <p:oleObj name="" r:id="rId1" imgW="11172825" imgH="5619750" progId="Paint.Picture">
+                  <p:embed/>
+                  <p:pic>
+                    <p:nvPicPr>
+                      <p:cNvPr id="0" name="Picture 6"/>
+                      <p:cNvPicPr/>
+                      <p:nvPr/>
+                    </p:nvPicPr>
+                    <p:blipFill>
+                      <a:blip r:embed="rId2"/>
+                      <a:stretch>
+                        <a:fillRect/>
+                      </a:stretch>
+                    </p:blipFill>
+                    <p:spPr>
+                      <a:xfrm>
+                        <a:off x="499110" y="866140"/>
+                        <a:ext cx="11269345" cy="5668645"/>
+                      </a:xfrm>
+                      <a:prstGeom prst="rect">
+                        <a:avLst/>
+                      </a:prstGeom>
+                    </p:spPr>
+                  </p:pic>
+                </p:oleObj>
+              </mc:Fallback>
+            </mc:AlternateContent>
+          </a:graphicData>
+        </a:graphic>
+      </p:graphicFrame>
     </p:spTree>
   </p:cSld>
   <p:clrMapOvr>

</xml_diff>